<commit_message>
Added a ticket lock
</commit_message>
<xml_diff>
--- a/C11/locks/MPSC-Mutex.pptx
+++ b/C11/locks/MPSC-Mutex.pptx
@@ -3578,11 +3578,7 @@
             </a:r>
             <a:r>
               <a:rPr lang="en-US" sz="1600" dirty="0" smtClean="0"/>
-              <a:t> that uses the MPSC queue as part of its synchronization </a:t>
-            </a:r>
-            <a:r>
-              <a:rPr lang="en-US" sz="1600" dirty="0" smtClean="0"/>
-              <a:t>mechanism</a:t>
+              <a:t> that uses the MPSC queue as part of its synchronization mechanism</a:t>
             </a:r>
             <a:r>
               <a:rPr lang="en-US" sz="1200" dirty="0" smtClean="0"/>
@@ -3650,13 +3646,8 @@
             </a:r>
             <a:r>
               <a:rPr lang="en-US" sz="1600" dirty="0" smtClean="0"/>
-              <a:t>: Assuming the OS or run-time can provide such a kind of guarantee (implies fairness in the thread-scheduler/manager), it guarantees that </a:t>
-            </a:r>
-            <a:r>
-              <a:rPr lang="en-US" sz="1600" dirty="0" smtClean="0"/>
-              <a:t>any given thread holding the lock will eventually run, if none of the previous ones gets a fault.</a:t>
-            </a:r>
-            <a:endParaRPr lang="en-US" sz="1600" dirty="0" smtClean="0"/>
+              <a:t>: Assuming the OS or run-time can provide such a kind of guarantee (implies fairness in the thread-scheduler/manager), it guarantees that any given thread holding the lock will eventually run, if none of the previous ones gets a fault.</a:t>
+            </a:r>
           </a:p>
           <a:p>
             <a:endParaRPr lang="en-US" sz="1600" dirty="0"/>
@@ -4258,7 +4249,6 @@
               <a:rPr lang="en-US" sz="1400" dirty="0" smtClean="0"/>
               <a:t>Thread 1’s node</a:t>
             </a:r>
-            <a:endParaRPr lang="en-US" sz="1400" dirty="0" smtClean="0"/>
           </a:p>
           <a:p>
             <a:pPr algn="ctr"/>
@@ -4350,7 +4340,6 @@
               <a:rPr lang="en-US" sz="1400" dirty="0" smtClean="0"/>
               <a:t>Thread 2’s node</a:t>
             </a:r>
-            <a:endParaRPr lang="en-US" sz="1400" dirty="0" smtClean="0"/>
           </a:p>
           <a:p>
             <a:pPr algn="ctr"/>
@@ -4514,7 +4503,6 @@
               <a:rPr lang="en-US" sz="1400" dirty="0" smtClean="0"/>
               <a:t>Thread 3’s node</a:t>
             </a:r>
-            <a:endParaRPr lang="en-US" sz="1400" dirty="0" smtClean="0"/>
           </a:p>
           <a:p>
             <a:pPr algn="ctr"/>
@@ -6026,11 +6014,6 @@
                 </a:rPr>
                 <a:t>2</a:t>
               </a:r>
-              <a:endParaRPr lang="en-US" sz="1000" b="1" dirty="0">
-                <a:solidFill>
-                  <a:srgbClr val="000000"/>
-                </a:solidFill>
-              </a:endParaRPr>
             </a:p>
           </p:txBody>
         </p:sp>
@@ -9037,7 +9020,6 @@
               <a:rPr lang="en-US" sz="1400" dirty="0" smtClean="0"/>
               <a:t>Thread 1’s node</a:t>
             </a:r>
-            <a:endParaRPr lang="en-US" sz="1400" dirty="0" smtClean="0"/>
           </a:p>
           <a:p>
             <a:pPr algn="ctr"/>
@@ -9129,7 +9111,6 @@
               <a:rPr lang="en-US" sz="1400" dirty="0" smtClean="0"/>
               <a:t>Thread 2’s node</a:t>
             </a:r>
-            <a:endParaRPr lang="en-US" sz="1400" dirty="0" smtClean="0"/>
           </a:p>
           <a:p>
             <a:pPr algn="ctr"/>
@@ -9293,7 +9274,6 @@
               <a:rPr lang="en-US" sz="1400" dirty="0" smtClean="0"/>
               <a:t>Thread 3’s node</a:t>
             </a:r>
-            <a:endParaRPr lang="en-US" sz="1400" dirty="0" smtClean="0"/>
           </a:p>
           <a:p>
             <a:pPr algn="ctr"/>
@@ -10805,11 +10785,6 @@
                 </a:rPr>
                 <a:t>2</a:t>
               </a:r>
-              <a:endParaRPr lang="en-US" sz="1000" b="1" dirty="0">
-                <a:solidFill>
-                  <a:srgbClr val="000000"/>
-                </a:solidFill>
-              </a:endParaRPr>
             </a:p>
           </p:txBody>
         </p:sp>

</xml_diff>